<commit_message>
AR : 20200520 : Updated the presentation with steps to set up Jupyter Notebook
</commit_message>
<xml_diff>
--- a/Python/Materials & Documents/Python_Training_Material.pptx
+++ b/Python/Materials & Documents/Python_Training_Material.pptx
@@ -5,10 +5,10 @@
     <p:sldMasterId id="2147483731" r:id="rId1"/>
   </p:sldMasterIdLst>
   <p:notesMasterIdLst>
-    <p:notesMasterId r:id="rId15"/>
+    <p:notesMasterId r:id="rId13"/>
   </p:notesMasterIdLst>
   <p:handoutMasterIdLst>
-    <p:handoutMasterId r:id="rId16"/>
+    <p:handoutMasterId r:id="rId14"/>
   </p:handoutMasterIdLst>
   <p:sldIdLst>
     <p:sldId id="256" r:id="rId2"/>
@@ -22,8 +22,6 @@
     <p:sldId id="264" r:id="rId10"/>
     <p:sldId id="265" r:id="rId11"/>
     <p:sldId id="266" r:id="rId12"/>
-    <p:sldId id="268" r:id="rId13"/>
-    <p:sldId id="267" r:id="rId14"/>
   </p:sldIdLst>
   <p:sldSz cx="9144000" cy="5143500" type="screen16x9"/>
   <p:notesSz cx="6858000" cy="9144000"/>
@@ -243,7 +241,7 @@
           <a:p>
             <a:fld id="{46EB041A-171E-47B9-998C-E30695083F34}" type="datetimeFigureOut">
               <a:rPr lang="en-GB" smtClean="0"/>
-              <a:t>07/01/2020</a:t>
+              <a:t>15/05/2020</a:t>
             </a:fld>
             <a:endParaRPr lang="en-GB"/>
           </a:p>
@@ -420,7 +418,7 @@
           <a:p>
             <a:fld id="{119532B7-0D94-194A-9A04-10C00E075814}" type="datetimeFigureOut">
               <a:rPr lang="en-US" smtClean="0"/>
-              <a:t>1/7/2020</a:t>
+              <a:t>5/15/2020</a:t>
             </a:fld>
             <a:endParaRPr lang="en-US" dirty="0"/>
           </a:p>
@@ -1962,7 +1960,7 @@
           <a:graphicData uri="http://schemas.openxmlformats.org/presentationml/2006/ole">
             <mc:AlternateContent xmlns:mc="http://schemas.openxmlformats.org/markup-compatibility/2006">
               <mc:Choice xmlns:v="urn:schemas-microsoft-com:vml" Requires="v">
-                <p:oleObj spid="_x0000_s19574" name="think-cell Slide" r:id="rId4" imgW="216" imgH="216" progId="TCLayout.ActiveDocument.1">
+                <p:oleObj spid="_x0000_s19577" name="think-cell Slide" r:id="rId4" imgW="216" imgH="216" progId="TCLayout.ActiveDocument.1">
                   <p:embed/>
                 </p:oleObj>
               </mc:Choice>
@@ -2872,7 +2870,7 @@
           <a:graphicData uri="http://schemas.openxmlformats.org/presentationml/2006/ole">
             <mc:AlternateContent xmlns:mc="http://schemas.openxmlformats.org/markup-compatibility/2006">
               <mc:Choice xmlns:v="urn:schemas-microsoft-com:vml" Requires="v">
-                <p:oleObj spid="_x0000_s31837" name="think-cell Slide" r:id="rId4" imgW="216" imgH="216" progId="TCLayout.ActiveDocument.1">
+                <p:oleObj spid="_x0000_s31840" name="think-cell Slide" r:id="rId4" imgW="216" imgH="216" progId="TCLayout.ActiveDocument.1">
                   <p:embed/>
                 </p:oleObj>
               </mc:Choice>
@@ -3782,7 +3780,7 @@
           <a:graphicData uri="http://schemas.openxmlformats.org/presentationml/2006/ole">
             <mc:AlternateContent xmlns:mc="http://schemas.openxmlformats.org/markup-compatibility/2006">
               <mc:Choice xmlns:v="urn:schemas-microsoft-com:vml" Requires="v">
-                <p:oleObj spid="_x0000_s35912" name="think-cell Slide" r:id="rId4" imgW="216" imgH="216" progId="TCLayout.ActiveDocument.1">
+                <p:oleObj spid="_x0000_s35915" name="think-cell Slide" r:id="rId4" imgW="216" imgH="216" progId="TCLayout.ActiveDocument.1">
                   <p:embed/>
                 </p:oleObj>
               </mc:Choice>
@@ -4699,7 +4697,7 @@
           <a:graphicData uri="http://schemas.openxmlformats.org/presentationml/2006/ole">
             <mc:AlternateContent xmlns:mc="http://schemas.openxmlformats.org/markup-compatibility/2006">
               <mc:Choice xmlns:v="urn:schemas-microsoft-com:vml" Requires="v">
-                <p:oleObj spid="_x0000_s37939" name="think-cell Slide" r:id="rId4" imgW="216" imgH="216" progId="TCLayout.ActiveDocument.1">
+                <p:oleObj spid="_x0000_s37942" name="think-cell Slide" r:id="rId4" imgW="216" imgH="216" progId="TCLayout.ActiveDocument.1">
                   <p:embed/>
                 </p:oleObj>
               </mc:Choice>
@@ -6566,7 +6564,7 @@
           <a:graphicData uri="http://schemas.openxmlformats.org/presentationml/2006/ole">
             <mc:AlternateContent xmlns:mc="http://schemas.openxmlformats.org/markup-compatibility/2006">
               <mc:Choice xmlns:v="urn:schemas-microsoft-com:vml" Requires="v">
-                <p:oleObj spid="_x0000_s27741" name="think-cell Slide" r:id="rId4" imgW="216" imgH="216" progId="TCLayout.ActiveDocument.1">
+                <p:oleObj spid="_x0000_s27744" name="think-cell Slide" r:id="rId4" imgW="216" imgH="216" progId="TCLayout.ActiveDocument.1">
                   <p:embed/>
                 </p:oleObj>
               </mc:Choice>
@@ -7476,7 +7474,7 @@
           <a:graphicData uri="http://schemas.openxmlformats.org/presentationml/2006/ole">
             <mc:AlternateContent xmlns:mc="http://schemas.openxmlformats.org/markup-compatibility/2006">
               <mc:Choice xmlns:v="urn:schemas-microsoft-com:vml" Requires="v">
-                <p:oleObj spid="_x0000_s36917" name="think-cell Slide" r:id="rId4" imgW="216" imgH="216" progId="TCLayout.ActiveDocument.1">
+                <p:oleObj spid="_x0000_s36920" name="think-cell Slide" r:id="rId4" imgW="216" imgH="216" progId="TCLayout.ActiveDocument.1">
                   <p:embed/>
                 </p:oleObj>
               </mc:Choice>
@@ -8386,7 +8384,7 @@
           <a:graphicData uri="http://schemas.openxmlformats.org/presentationml/2006/ole">
             <mc:AlternateContent xmlns:mc="http://schemas.openxmlformats.org/markup-compatibility/2006">
               <mc:Choice xmlns:v="urn:schemas-microsoft-com:vml" Requires="v">
-                <p:oleObj spid="_x0000_s29789" name="think-cell Slide" r:id="rId4" imgW="216" imgH="216" progId="TCLayout.ActiveDocument.1">
+                <p:oleObj spid="_x0000_s29792" name="think-cell Slide" r:id="rId4" imgW="216" imgH="216" progId="TCLayout.ActiveDocument.1">
                   <p:embed/>
                 </p:oleObj>
               </mc:Choice>
@@ -9296,7 +9294,7 @@
           <a:graphicData uri="http://schemas.openxmlformats.org/presentationml/2006/ole">
             <mc:AlternateContent xmlns:mc="http://schemas.openxmlformats.org/markup-compatibility/2006">
               <mc:Choice xmlns:v="urn:schemas-microsoft-com:vml" Requires="v">
-                <p:oleObj spid="_x0000_s28765" name="think-cell Slide" r:id="rId4" imgW="216" imgH="216" progId="TCLayout.ActiveDocument.1">
+                <p:oleObj spid="_x0000_s28768" name="think-cell Slide" r:id="rId4" imgW="216" imgH="216" progId="TCLayout.ActiveDocument.1">
                   <p:embed/>
                 </p:oleObj>
               </mc:Choice>
@@ -10230,47 +10228,19 @@
             <p:ph type="body" sz="quarter" idx="21"/>
           </p:nvPr>
         </p:nvSpPr>
-        <p:spPr/>
+        <p:spPr>
+          <a:xfrm>
+            <a:off x="88933" y="3021518"/>
+            <a:ext cx="2222218" cy="216982"/>
+          </a:xfrm>
+        </p:spPr>
         <p:txBody>
           <a:bodyPr/>
           <a:lstStyle/>
           <a:p>
             <a:r>
               <a:rPr lang="en-US" dirty="0"/>
-              <a:t>Aakaash Ramnath</a:t>
-            </a:r>
-          </a:p>
-        </p:txBody>
-      </p:sp>
-      <p:sp>
-        <p:nvSpPr>
-          <p:cNvPr id="7" name="Text Placeholder 6">
-            <a:extLst>
-              <a:ext uri="{FF2B5EF4-FFF2-40B4-BE49-F238E27FC236}">
-                <a16:creationId xmlns:a16="http://schemas.microsoft.com/office/drawing/2014/main" id="{6A69CC26-BEF4-264F-A30F-01FB0D2094F9}"/>
-              </a:ext>
-            </a:extLst>
-          </p:cNvPr>
-          <p:cNvSpPr>
-            <a:spLocks noGrp="1"/>
-          </p:cNvSpPr>
-          <p:nvPr>
-            <p:ph type="body" sz="quarter" idx="22"/>
-          </p:nvPr>
-        </p:nvSpPr>
-        <p:spPr>
-          <a:xfrm>
-            <a:off x="92834" y="1570491"/>
-            <a:ext cx="2222218" cy="216982"/>
-          </a:xfrm>
-        </p:spPr>
-        <p:txBody>
-          <a:bodyPr/>
-          <a:lstStyle/>
-          <a:p>
-            <a:r>
-              <a:rPr lang="en-US" dirty="0"/>
-              <a:t>Data Engineering Consultant</a:t>
+              <a:t>By : Aakaash Ramnath</a:t>
             </a:r>
           </a:p>
         </p:txBody>
@@ -10368,14 +10338,27 @@
             <p:ph type="title"/>
           </p:nvPr>
         </p:nvSpPr>
-        <p:spPr/>
+        <p:spPr>
+          <a:xfrm>
+            <a:off x="628649" y="1972901"/>
+            <a:ext cx="4897507" cy="994172"/>
+          </a:xfrm>
+        </p:spPr>
         <p:txBody>
           <a:bodyPr/>
           <a:lstStyle/>
           <a:p>
             <a:r>
               <a:rPr lang="en-IN" dirty="0"/>
-              <a:t>Learning to code</a:t>
+              <a:t>Setting up </a:t>
+            </a:r>
+            <a:r>
+              <a:rPr lang="en-IN" dirty="0" err="1"/>
+              <a:t>Jupyter</a:t>
+            </a:r>
+            <a:r>
+              <a:rPr lang="en-IN" dirty="0"/>
+              <a:t> Notebook</a:t>
             </a:r>
           </a:p>
         </p:txBody>
@@ -10445,7 +10428,7 @@
           <p:cNvPr id="2" name="Title 1">
             <a:extLst>
               <a:ext uri="{FF2B5EF4-FFF2-40B4-BE49-F238E27FC236}">
-                <a16:creationId xmlns:a16="http://schemas.microsoft.com/office/drawing/2014/main" id="{129CEF2C-888B-4E02-AD4D-ED734E8C22D9}"/>
+                <a16:creationId xmlns:a16="http://schemas.microsoft.com/office/drawing/2014/main" id="{80EB57AE-BAE9-421A-9E71-4C90A01BB362}"/>
               </a:ext>
             </a:extLst>
           </p:cNvPr>
@@ -10463,7 +10446,15 @@
           <a:p>
             <a:r>
               <a:rPr lang="en-IN" dirty="0"/>
-              <a:t>Basics of Python</a:t>
+              <a:t>Install </a:t>
+            </a:r>
+            <a:r>
+              <a:rPr lang="en-IN" dirty="0" err="1"/>
+              <a:t>Jupyter</a:t>
+            </a:r>
+            <a:r>
+              <a:rPr lang="en-IN" dirty="0"/>
+              <a:t> Notebook</a:t>
             </a:r>
           </a:p>
         </p:txBody>
@@ -10473,7 +10464,7 @@
           <p:cNvPr id="3" name="Content Placeholder 2">
             <a:extLst>
               <a:ext uri="{FF2B5EF4-FFF2-40B4-BE49-F238E27FC236}">
-                <a16:creationId xmlns:a16="http://schemas.microsoft.com/office/drawing/2014/main" id="{4755DF92-2C08-438C-BF49-7DEE45375A59}"/>
+                <a16:creationId xmlns:a16="http://schemas.microsoft.com/office/drawing/2014/main" id="{AB20D6C4-FE4D-48AB-BF0D-4FFAB6255AD5}"/>
               </a:ext>
             </a:extLst>
           </p:cNvPr>
@@ -10484,187 +10475,121 @@
             <p:ph idx="1"/>
           </p:nvPr>
         </p:nvSpPr>
-        <p:spPr>
-          <a:xfrm>
-            <a:off x="217714" y="765295"/>
-            <a:ext cx="8708571" cy="3906475"/>
-          </a:xfrm>
-        </p:spPr>
+        <p:spPr/>
         <p:txBody>
           <a:bodyPr/>
           <a:lstStyle/>
           <a:p>
             <a:r>
-              <a:rPr lang="en-US" sz="1000" dirty="0"/>
-              <a:t>Variables are containers for storing data values. Unlike other programming languages, Python has no command for declaring a variable. A variable is created the moment you first assign a value to it.</a:t>
-            </a:r>
-          </a:p>
-          <a:p>
-            <a:r>
-              <a:rPr lang="en-US" sz="1000" dirty="0"/>
-              <a:t>Data Types in Python</a:t>
-            </a:r>
-          </a:p>
-          <a:p>
-            <a:pPr lvl="1"/>
-            <a:r>
-              <a:rPr lang="en-IN" sz="888" i="1" dirty="0"/>
-              <a:t>Text Type: </a:t>
-            </a:r>
-            <a:r>
-              <a:rPr lang="en-IN" sz="888" dirty="0"/>
-              <a:t>str</a:t>
-            </a:r>
-          </a:p>
-          <a:p>
-            <a:pPr lvl="1"/>
-            <a:r>
-              <a:rPr lang="en-IN" sz="888" i="1" dirty="0"/>
-              <a:t>Numeric Types: </a:t>
-            </a:r>
-            <a:r>
-              <a:rPr lang="en-IN" sz="900" dirty="0"/>
-              <a:t>int, float, complex</a:t>
-            </a:r>
-          </a:p>
-          <a:p>
-            <a:pPr lvl="1"/>
-            <a:r>
-              <a:rPr lang="en-IN" sz="888" i="1" dirty="0"/>
-              <a:t>Sequence Types: </a:t>
-            </a:r>
-            <a:r>
-              <a:rPr lang="en-IN" sz="900" dirty="0"/>
-              <a:t>list, tuple, range</a:t>
-            </a:r>
-          </a:p>
-          <a:p>
-            <a:pPr lvl="1"/>
-            <a:r>
-              <a:rPr lang="en-IN" sz="888" i="1" dirty="0"/>
-              <a:t>Mapping Type: </a:t>
-            </a:r>
-            <a:r>
-              <a:rPr lang="en-IN" sz="900" dirty="0" err="1"/>
-              <a:t>dict</a:t>
-            </a:r>
-            <a:endParaRPr lang="en-IN" sz="888" dirty="0"/>
-          </a:p>
-          <a:p>
-            <a:pPr lvl="1"/>
-            <a:r>
-              <a:rPr lang="en-IN" sz="888" i="1" dirty="0"/>
-              <a:t>Set Types: </a:t>
-            </a:r>
-            <a:r>
-              <a:rPr lang="en-IN" sz="900" dirty="0"/>
-              <a:t>set, </a:t>
-            </a:r>
-            <a:r>
-              <a:rPr lang="en-IN" sz="900" dirty="0" err="1"/>
-              <a:t>frozenset</a:t>
-            </a:r>
-            <a:endParaRPr lang="en-IN" sz="900" dirty="0"/>
-          </a:p>
-          <a:p>
-            <a:pPr lvl="1"/>
-            <a:r>
-              <a:rPr lang="en-IN" sz="888" i="1" dirty="0"/>
-              <a:t>Boolean Type: </a:t>
-            </a:r>
-            <a:r>
-              <a:rPr lang="en-IN" sz="900" dirty="0"/>
-              <a:t>bool</a:t>
-            </a:r>
-            <a:endParaRPr lang="en-IN" sz="888" dirty="0"/>
-          </a:p>
-          <a:p>
-            <a:pPr lvl="1"/>
-            <a:r>
-              <a:rPr lang="en-IN" sz="888" i="1" dirty="0"/>
-              <a:t>Binary Types:</a:t>
-            </a:r>
-            <a:r>
-              <a:rPr lang="en-IN" sz="888" dirty="0"/>
-              <a:t> </a:t>
-            </a:r>
-            <a:r>
-              <a:rPr lang="en-IN" sz="900" dirty="0"/>
-              <a:t>bytes, </a:t>
-            </a:r>
-            <a:r>
-              <a:rPr lang="en-IN" sz="900" dirty="0" err="1"/>
-              <a:t>bytearray</a:t>
-            </a:r>
-            <a:r>
-              <a:rPr lang="en-IN" sz="900" dirty="0"/>
-              <a:t>, </a:t>
-            </a:r>
-            <a:r>
-              <a:rPr lang="en-IN" sz="900" dirty="0" err="1"/>
-              <a:t>memoryview</a:t>
-            </a:r>
-            <a:endParaRPr lang="en-IN" sz="900" dirty="0"/>
-          </a:p>
-          <a:p>
-            <a:r>
-              <a:rPr lang="en-IN" sz="1000" dirty="0"/>
-              <a:t>Classic exercise whatever language you learn – Print Hello World !!!. But let’s do something different. Print Hey User !!!. No much difference LOL…</a:t>
-            </a:r>
-          </a:p>
-          <a:p>
-            <a:r>
-              <a:rPr lang="en-IN" sz="1000" dirty="0"/>
-              <a:t>There are 3 ways you can declare string in Python</a:t>
-            </a:r>
-          </a:p>
-          <a:p>
-            <a:pPr lvl="1"/>
-            <a:r>
-              <a:rPr lang="en-IN" sz="888" dirty="0"/>
-              <a:t>“One way”</a:t>
-            </a:r>
-          </a:p>
-          <a:p>
-            <a:pPr lvl="1"/>
-            <a:r>
-              <a:rPr lang="en-IN" sz="888" dirty="0"/>
-              <a:t>‘Another way’</a:t>
-            </a:r>
-          </a:p>
-          <a:p>
-            <a:pPr lvl="1"/>
-            <a:r>
-              <a:rPr lang="en-IN" sz="888" dirty="0"/>
-              <a:t>“””Other way””” (Used for multi-line strings)</a:t>
-            </a:r>
-          </a:p>
-          <a:p>
-            <a:pPr lvl="1"/>
-            <a:endParaRPr lang="en-IN" sz="888" dirty="0"/>
-          </a:p>
-          <a:p>
-            <a:pPr lvl="1"/>
-            <a:endParaRPr lang="en-IN" sz="888" dirty="0"/>
-          </a:p>
-          <a:p>
-            <a:pPr lvl="1"/>
-            <a:endParaRPr lang="en-IN" sz="888" dirty="0"/>
-          </a:p>
-          <a:p>
-            <a:pPr marL="270039" lvl="1" indent="0">
+              <a:rPr lang="en-IN" dirty="0"/>
+              <a:t>Open command prompt with Administrator privileges</a:t>
+            </a:r>
+          </a:p>
+          <a:p>
+            <a:endParaRPr lang="en-IN" dirty="0"/>
+          </a:p>
+          <a:p>
+            <a:endParaRPr lang="en-IN" dirty="0"/>
+          </a:p>
+          <a:p>
+            <a:endParaRPr lang="en-IN" dirty="0"/>
+          </a:p>
+          <a:p>
+            <a:endParaRPr lang="en-IN" dirty="0"/>
+          </a:p>
+          <a:p>
+            <a:r>
+              <a:rPr lang="en-IN" dirty="0"/>
+              <a:t>Type “pip install </a:t>
+            </a:r>
+            <a:r>
+              <a:rPr lang="en-IN" dirty="0" err="1"/>
+              <a:t>jupyter</a:t>
+            </a:r>
+            <a:r>
+              <a:rPr lang="en-IN" dirty="0"/>
+              <a:t> notebook” and Hit enter</a:t>
+            </a:r>
+          </a:p>
+          <a:p>
+            <a:endParaRPr lang="en-IN" dirty="0"/>
+          </a:p>
+          <a:p>
+            <a:endParaRPr lang="en-IN" dirty="0"/>
+          </a:p>
+          <a:p>
+            <a:endParaRPr lang="en-IN" dirty="0"/>
+          </a:p>
+          <a:p>
+            <a:r>
+              <a:rPr lang="en-IN" dirty="0"/>
+              <a:t>Wait for it to install. Once it has completed, Type </a:t>
+            </a:r>
+            <a:r>
+              <a:rPr lang="en-IN" dirty="0" err="1"/>
+              <a:t>jupyter</a:t>
+            </a:r>
+            <a:r>
+              <a:rPr lang="en-IN" dirty="0"/>
+              <a:t> notebook in the console to open </a:t>
+            </a:r>
+            <a:r>
+              <a:rPr lang="en-IN" dirty="0" err="1"/>
+              <a:t>Jupyter</a:t>
+            </a:r>
+            <a:r>
+              <a:rPr lang="en-IN" dirty="0"/>
+              <a:t> notebook</a:t>
+            </a:r>
+          </a:p>
+          <a:p>
+            <a:endParaRPr lang="en-IN" dirty="0"/>
+          </a:p>
+          <a:p>
+            <a:endParaRPr lang="en-IN" dirty="0"/>
+          </a:p>
+          <a:p>
+            <a:endParaRPr lang="en-IN" dirty="0"/>
+          </a:p>
+          <a:p>
+            <a:endParaRPr lang="en-IN" dirty="0"/>
+          </a:p>
+          <a:p>
+            <a:r>
+              <a:rPr lang="en-IN" dirty="0"/>
+              <a:t>If you want to open a notebook or create one in particular location, navigate to that location through command prompt and follow step 2</a:t>
+            </a:r>
+          </a:p>
+          <a:p>
+            <a:pPr marL="0" indent="0">
               <a:buNone/>
             </a:pPr>
-            <a:endParaRPr lang="en-IN" sz="888" dirty="0"/>
-          </a:p>
-          <a:p>
-            <a:r>
-              <a:rPr lang="en-IN" sz="1000" dirty="0"/>
-              <a:t>You can convert anything explicitly into String datatype by using str() in built function</a:t>
-            </a:r>
-          </a:p>
-          <a:p>
-            <a:endParaRPr lang="en-IN" sz="1000" dirty="0"/>
+            <a:endParaRPr lang="en-IN" dirty="0"/>
+          </a:p>
+          <a:p>
+            <a:pPr marL="0" indent="0">
+              <a:buNone/>
+            </a:pPr>
+            <a:r>
+              <a:rPr lang="en-IN" dirty="0"/>
+              <a:t>Note : Above steps will work only if you have </a:t>
+            </a:r>
+            <a:r>
+              <a:rPr lang="en-IN"/>
+              <a:t>set python/pip </a:t>
+            </a:r>
+            <a:r>
+              <a:rPr lang="en-IN" dirty="0"/>
+              <a:t>to your </a:t>
+            </a:r>
+            <a:r>
+              <a:rPr lang="en-IN"/>
+              <a:t>environment variable</a:t>
+            </a:r>
+            <a:endParaRPr lang="en-IN" dirty="0"/>
+          </a:p>
+          <a:p>
+            <a:endParaRPr lang="en-IN" dirty="0"/>
           </a:p>
         </p:txBody>
       </p:sp>
@@ -10673,7 +10598,7 @@
           <p:cNvPr id="4" name="Text Placeholder 3">
             <a:extLst>
               <a:ext uri="{FF2B5EF4-FFF2-40B4-BE49-F238E27FC236}">
-                <a16:creationId xmlns:a16="http://schemas.microsoft.com/office/drawing/2014/main" id="{3B0700CB-24E5-407A-BB92-9D0B11ED336A}"/>
+                <a16:creationId xmlns:a16="http://schemas.microsoft.com/office/drawing/2014/main" id="{EC347B2F-534E-4291-9107-D2E30299356D}"/>
               </a:ext>
             </a:extLst>
           </p:cNvPr>
@@ -10686,8 +10611,8 @@
         </p:nvSpPr>
         <p:spPr>
           <a:xfrm>
-            <a:off x="217715" y="471730"/>
-            <a:ext cx="8708571" cy="237261"/>
+            <a:off x="217715" y="573715"/>
+            <a:ext cx="8708571" cy="181660"/>
           </a:xfrm>
         </p:spPr>
         <p:txBody>
@@ -10695,8 +10620,16 @@
           <a:lstStyle/>
           <a:p>
             <a:r>
-              <a:rPr lang="en-IN" sz="1200" dirty="0"/>
-              <a:t>Data Types</a:t>
+              <a:rPr lang="en-IN" dirty="0"/>
+              <a:t>For using the learning-python3.ipynb file, you need </a:t>
+            </a:r>
+            <a:r>
+              <a:rPr lang="en-IN" dirty="0" err="1"/>
+              <a:t>Jupyter</a:t>
+            </a:r>
+            <a:r>
+              <a:rPr lang="en-IN" dirty="0"/>
+              <a:t> Notebook</a:t>
             </a:r>
           </a:p>
         </p:txBody>
@@ -10706,7 +10639,7 @@
           <p:cNvPr id="5" name="Slide Number Placeholder 4">
             <a:extLst>
               <a:ext uri="{FF2B5EF4-FFF2-40B4-BE49-F238E27FC236}">
-                <a16:creationId xmlns:a16="http://schemas.microsoft.com/office/drawing/2014/main" id="{21CCCB18-2FD2-4768-A5BA-94056FFFDB99}"/>
+                <a16:creationId xmlns:a16="http://schemas.microsoft.com/office/drawing/2014/main" id="{CF9AEB4A-D002-4B5A-AE3B-2E51D4A2FBAB}"/>
               </a:ext>
             </a:extLst>
           </p:cNvPr>
@@ -10733,10 +10666,10 @@
       </p:sp>
       <p:pic>
         <p:nvPicPr>
-          <p:cNvPr id="7" name="Picture 6">
+          <p:cNvPr id="6" name="Picture 5">
             <a:extLst>
               <a:ext uri="{FF2B5EF4-FFF2-40B4-BE49-F238E27FC236}">
-                <a16:creationId xmlns:a16="http://schemas.microsoft.com/office/drawing/2014/main" id="{396D4309-D81A-4263-A836-903E5023E8B8}"/>
+                <a16:creationId xmlns:a16="http://schemas.microsoft.com/office/drawing/2014/main" id="{D38F8331-DC9C-44FD-8577-7A33060AF13C}"/>
               </a:ext>
             </a:extLst>
           </p:cNvPr>
@@ -10753,8 +10686,8 @@
         </p:blipFill>
         <p:spPr>
           <a:xfrm>
-            <a:off x="586386" y="3573966"/>
-            <a:ext cx="2064049" cy="655202"/>
+            <a:off x="482669" y="1246118"/>
+            <a:ext cx="1750323" cy="799482"/>
           </a:xfrm>
           <a:prstGeom prst="rect">
             <a:avLst/>
@@ -10763,10 +10696,10 @@
       </p:pic>
       <p:pic>
         <p:nvPicPr>
-          <p:cNvPr id="9" name="Picture 8">
+          <p:cNvPr id="7" name="Picture 6">
             <a:extLst>
               <a:ext uri="{FF2B5EF4-FFF2-40B4-BE49-F238E27FC236}">
-                <a16:creationId xmlns:a16="http://schemas.microsoft.com/office/drawing/2014/main" id="{9618A653-EBDF-48E0-8093-40309A2B2A15}"/>
+                <a16:creationId xmlns:a16="http://schemas.microsoft.com/office/drawing/2014/main" id="{D0F0E488-F01D-4AEB-ABB5-D7CDE6BDDFF0}"/>
               </a:ext>
             </a:extLst>
           </p:cNvPr>
@@ -10783,275 +10716,8 @@
         </p:blipFill>
         <p:spPr>
           <a:xfrm>
-            <a:off x="5157467" y="2906125"/>
-            <a:ext cx="3184776" cy="1710914"/>
-          </a:xfrm>
-          <a:prstGeom prst="rect">
-            <a:avLst/>
-          </a:prstGeom>
-        </p:spPr>
-      </p:pic>
-    </p:spTree>
-    <p:extLst>
-      <p:ext uri="{BB962C8B-B14F-4D97-AF65-F5344CB8AC3E}">
-        <p14:creationId xmlns:p14="http://schemas.microsoft.com/office/powerpoint/2010/main" val="7472430"/>
-      </p:ext>
-    </p:extLst>
-  </p:cSld>
-  <p:clrMapOvr>
-    <a:masterClrMapping/>
-  </p:clrMapOvr>
-</p:sld>
-</file>
-
-<file path=ppt/slides/slide12.xml><?xml version="1.0" encoding="utf-8"?>
-<p:sld xmlns:a="http://schemas.openxmlformats.org/drawingml/2006/main" xmlns:r="http://schemas.openxmlformats.org/officeDocument/2006/relationships" xmlns:p="http://schemas.openxmlformats.org/presentationml/2006/main">
-  <p:cSld>
-    <p:spTree>
-      <p:nvGrpSpPr>
-        <p:cNvPr id="1" name=""/>
-        <p:cNvGrpSpPr/>
-        <p:nvPr/>
-      </p:nvGrpSpPr>
-      <p:grpSpPr>
-        <a:xfrm>
-          <a:off x="0" y="0"/>
-          <a:ext cx="0" cy="0"/>
-          <a:chOff x="0" y="0"/>
-          <a:chExt cx="0" cy="0"/>
-        </a:xfrm>
-      </p:grpSpPr>
-      <p:sp>
-        <p:nvSpPr>
-          <p:cNvPr id="2" name="Title 1">
-            <a:extLst>
-              <a:ext uri="{FF2B5EF4-FFF2-40B4-BE49-F238E27FC236}">
-                <a16:creationId xmlns:a16="http://schemas.microsoft.com/office/drawing/2014/main" id="{0D595F6D-A7C2-47F0-B9D8-4B46E4BBA672}"/>
-              </a:ext>
-            </a:extLst>
-          </p:cNvPr>
-          <p:cNvSpPr>
-            <a:spLocks noGrp="1"/>
-          </p:cNvSpPr>
-          <p:nvPr>
-            <p:ph type="title"/>
-          </p:nvPr>
-        </p:nvSpPr>
-        <p:spPr/>
-        <p:txBody>
-          <a:bodyPr/>
-          <a:lstStyle/>
-          <a:p>
-            <a:r>
-              <a:rPr lang="en-IN" dirty="0"/>
-              <a:t>Basics of Python</a:t>
-            </a:r>
-          </a:p>
-        </p:txBody>
-      </p:sp>
-      <p:sp>
-        <p:nvSpPr>
-          <p:cNvPr id="3" name="Content Placeholder 2">
-            <a:extLst>
-              <a:ext uri="{FF2B5EF4-FFF2-40B4-BE49-F238E27FC236}">
-                <a16:creationId xmlns:a16="http://schemas.microsoft.com/office/drawing/2014/main" id="{5840EB64-C930-4EB6-914E-A69CE6B0D687}"/>
-              </a:ext>
-            </a:extLst>
-          </p:cNvPr>
-          <p:cNvSpPr>
-            <a:spLocks noGrp="1"/>
-          </p:cNvSpPr>
-          <p:nvPr>
-            <p:ph idx="1"/>
-          </p:nvPr>
-        </p:nvSpPr>
-        <p:spPr>
-          <a:xfrm>
-            <a:off x="217715" y="851871"/>
-            <a:ext cx="8708571" cy="3941371"/>
-          </a:xfrm>
-        </p:spPr>
-        <p:txBody>
-          <a:bodyPr/>
-          <a:lstStyle/>
-          <a:p>
-            <a:r>
-              <a:rPr lang="en-IN" dirty="0"/>
-              <a:t>If …. else (Conditional block)</a:t>
-            </a:r>
-          </a:p>
-          <a:p>
-            <a:pPr lvl="1"/>
-            <a:r>
-              <a:rPr lang="en-IN" dirty="0"/>
-              <a:t>Used with logical operators to check the conditions</a:t>
-            </a:r>
-          </a:p>
-          <a:p>
-            <a:pPr lvl="1"/>
-            <a:r>
-              <a:rPr lang="en-IN" dirty="0"/>
-              <a:t>Will go into </a:t>
-            </a:r>
-            <a:r>
-              <a:rPr lang="en-IN" i="1" dirty="0"/>
-              <a:t>if</a:t>
-            </a:r>
-            <a:r>
-              <a:rPr lang="en-IN" dirty="0"/>
-              <a:t> or </a:t>
-            </a:r>
-            <a:r>
-              <a:rPr lang="en-IN" i="1" dirty="0" err="1"/>
-              <a:t>elif</a:t>
-            </a:r>
-            <a:r>
-              <a:rPr lang="en-IN" dirty="0"/>
-              <a:t> block only if the condition against them returns True</a:t>
-            </a:r>
-          </a:p>
-          <a:p>
-            <a:pPr lvl="1"/>
-            <a:r>
-              <a:rPr lang="en-IN" dirty="0"/>
-              <a:t>If none of the </a:t>
-            </a:r>
-            <a:r>
-              <a:rPr lang="en-IN" i="1" dirty="0"/>
-              <a:t>if</a:t>
-            </a:r>
-            <a:r>
-              <a:rPr lang="en-IN" dirty="0"/>
-              <a:t> or </a:t>
-            </a:r>
-            <a:r>
-              <a:rPr lang="en-IN" i="1" dirty="0" err="1"/>
-              <a:t>elif</a:t>
-            </a:r>
-            <a:r>
-              <a:rPr lang="en-IN" dirty="0"/>
-              <a:t> conditions are True, only then it executes the statement in else block</a:t>
-            </a:r>
-          </a:p>
-          <a:p>
-            <a:r>
-              <a:rPr lang="en-IN" dirty="0"/>
-              <a:t>For (Looping)</a:t>
-            </a:r>
-          </a:p>
-          <a:p>
-            <a:pPr lvl="1"/>
-            <a:r>
-              <a:rPr lang="en-IN" dirty="0"/>
-              <a:t>Used for iterating over sequence</a:t>
-            </a:r>
-          </a:p>
-          <a:p>
-            <a:r>
-              <a:rPr lang="en-IN" dirty="0"/>
-              <a:t>While (Looping)</a:t>
-            </a:r>
-          </a:p>
-          <a:p>
-            <a:pPr lvl="1"/>
-            <a:r>
-              <a:rPr lang="en-IN" dirty="0"/>
-              <a:t>One of the primitive looping in Python</a:t>
-            </a:r>
-          </a:p>
-          <a:p>
-            <a:pPr lvl="1"/>
-            <a:endParaRPr lang="en-IN" dirty="0"/>
-          </a:p>
-        </p:txBody>
-      </p:sp>
-      <p:sp>
-        <p:nvSpPr>
-          <p:cNvPr id="4" name="Text Placeholder 3">
-            <a:extLst>
-              <a:ext uri="{FF2B5EF4-FFF2-40B4-BE49-F238E27FC236}">
-                <a16:creationId xmlns:a16="http://schemas.microsoft.com/office/drawing/2014/main" id="{524355A0-F8D8-47DC-9C07-A8C52945EE05}"/>
-              </a:ext>
-            </a:extLst>
-          </p:cNvPr>
-          <p:cNvSpPr>
-            <a:spLocks noGrp="1"/>
-          </p:cNvSpPr>
-          <p:nvPr>
-            <p:ph type="body" sz="quarter" idx="13"/>
-          </p:nvPr>
-        </p:nvSpPr>
-        <p:spPr>
-          <a:xfrm>
-            <a:off x="217715" y="444089"/>
-            <a:ext cx="8708571" cy="211432"/>
-          </a:xfrm>
-        </p:spPr>
-        <p:txBody>
-          <a:bodyPr/>
-          <a:lstStyle/>
-          <a:p>
-            <a:r>
-              <a:rPr lang="en-IN" dirty="0"/>
-              <a:t>Condition blocks &amp; Looping</a:t>
-            </a:r>
-          </a:p>
-        </p:txBody>
-      </p:sp>
-      <p:sp>
-        <p:nvSpPr>
-          <p:cNvPr id="5" name="Slide Number Placeholder 4">
-            <a:extLst>
-              <a:ext uri="{FF2B5EF4-FFF2-40B4-BE49-F238E27FC236}">
-                <a16:creationId xmlns:a16="http://schemas.microsoft.com/office/drawing/2014/main" id="{90C4DA51-9B85-4F53-A7CC-680B1E513CD9}"/>
-              </a:ext>
-            </a:extLst>
-          </p:cNvPr>
-          <p:cNvSpPr>
-            <a:spLocks noGrp="1"/>
-          </p:cNvSpPr>
-          <p:nvPr>
-            <p:ph type="sldNum" sz="quarter" idx="14"/>
-          </p:nvPr>
-        </p:nvSpPr>
-        <p:spPr/>
-        <p:txBody>
-          <a:bodyPr/>
-          <a:lstStyle/>
-          <a:p>
-            <a:fld id="{E33D0D4A-F9CC-8542-A7C1-048739268B18}" type="slidenum">
-              <a:rPr lang="en-US" smtClean="0"/>
-              <a:pPr/>
-              <a:t>12</a:t>
-            </a:fld>
-            <a:endParaRPr lang="en-US"/>
-          </a:p>
-        </p:txBody>
-      </p:sp>
-      <p:pic>
-        <p:nvPicPr>
-          <p:cNvPr id="7" name="Picture 6">
-            <a:extLst>
-              <a:ext uri="{FF2B5EF4-FFF2-40B4-BE49-F238E27FC236}">
-                <a16:creationId xmlns:a16="http://schemas.microsoft.com/office/drawing/2014/main" id="{8110FFFA-9C0E-4491-9A1F-416CA6BC0953}"/>
-              </a:ext>
-            </a:extLst>
-          </p:cNvPr>
-          <p:cNvPicPr>
-            <a:picLocks noChangeAspect="1"/>
-          </p:cNvPicPr>
-          <p:nvPr/>
-        </p:nvPicPr>
-        <p:blipFill>
-          <a:blip r:embed="rId2"/>
-          <a:stretch>
-            <a:fillRect/>
-          </a:stretch>
-        </p:blipFill>
-        <p:spPr>
-          <a:xfrm>
-            <a:off x="5384732" y="1025127"/>
-            <a:ext cx="2019922" cy="1198169"/>
+            <a:off x="482669" y="2389060"/>
+            <a:ext cx="3046893" cy="440280"/>
           </a:xfrm>
           <a:prstGeom prst="rect">
             <a:avLst/>
@@ -11063,37 +10729,7 @@
           <p:cNvPr id="8" name="Picture 7">
             <a:extLst>
               <a:ext uri="{FF2B5EF4-FFF2-40B4-BE49-F238E27FC236}">
-                <a16:creationId xmlns:a16="http://schemas.microsoft.com/office/drawing/2014/main" id="{4841AC09-691E-441F-AFD9-C6AF66E90C42}"/>
-              </a:ext>
-            </a:extLst>
-          </p:cNvPr>
-          <p:cNvPicPr>
-            <a:picLocks noChangeAspect="1"/>
-          </p:cNvPicPr>
-          <p:nvPr/>
-        </p:nvPicPr>
-        <p:blipFill>
-          <a:blip r:embed="rId3"/>
-          <a:stretch>
-            <a:fillRect/>
-          </a:stretch>
-        </p:blipFill>
-        <p:spPr>
-          <a:xfrm>
-            <a:off x="552863" y="2615434"/>
-            <a:ext cx="2047875" cy="657225"/>
-          </a:xfrm>
-          <a:prstGeom prst="rect">
-            <a:avLst/>
-          </a:prstGeom>
-        </p:spPr>
-      </p:pic>
-      <p:pic>
-        <p:nvPicPr>
-          <p:cNvPr id="9" name="Picture 8">
-            <a:extLst>
-              <a:ext uri="{FF2B5EF4-FFF2-40B4-BE49-F238E27FC236}">
-                <a16:creationId xmlns:a16="http://schemas.microsoft.com/office/drawing/2014/main" id="{35BFC25A-A6BC-4F64-AC01-025FAEF5FF83}"/>
+                <a16:creationId xmlns:a16="http://schemas.microsoft.com/office/drawing/2014/main" id="{4DA05559-19D9-4D0D-9AA3-56D85733EED9}"/>
               </a:ext>
             </a:extLst>
           </p:cNvPr>
@@ -11110,630 +10746,18 @@
         </p:blipFill>
         <p:spPr>
           <a:xfrm>
-            <a:off x="2844720" y="3907416"/>
-            <a:ext cx="1905000" cy="619125"/>
+            <a:off x="482669" y="3263303"/>
+            <a:ext cx="2795131" cy="691215"/>
           </a:xfrm>
           <a:prstGeom prst="rect">
             <a:avLst/>
           </a:prstGeom>
         </p:spPr>
       </p:pic>
-      <p:pic>
-        <p:nvPicPr>
-          <p:cNvPr id="10" name="Picture 9">
-            <a:extLst>
-              <a:ext uri="{FF2B5EF4-FFF2-40B4-BE49-F238E27FC236}">
-                <a16:creationId xmlns:a16="http://schemas.microsoft.com/office/drawing/2014/main" id="{2BECEC42-39EA-456D-9EEE-BB2775880B60}"/>
-              </a:ext>
-            </a:extLst>
-          </p:cNvPr>
-          <p:cNvPicPr>
-            <a:picLocks noChangeAspect="1"/>
-          </p:cNvPicPr>
-          <p:nvPr/>
-        </p:nvPicPr>
-        <p:blipFill>
-          <a:blip r:embed="rId5"/>
-          <a:stretch>
-            <a:fillRect/>
-          </a:stretch>
-        </p:blipFill>
-        <p:spPr>
-          <a:xfrm>
-            <a:off x="3489879" y="2588839"/>
-            <a:ext cx="3914775" cy="923925"/>
-          </a:xfrm>
-          <a:prstGeom prst="rect">
-            <a:avLst/>
-          </a:prstGeom>
-        </p:spPr>
-      </p:pic>
-      <p:pic>
-        <p:nvPicPr>
-          <p:cNvPr id="11" name="Picture 10">
-            <a:extLst>
-              <a:ext uri="{FF2B5EF4-FFF2-40B4-BE49-F238E27FC236}">
-                <a16:creationId xmlns:a16="http://schemas.microsoft.com/office/drawing/2014/main" id="{B84FA904-99FD-4D86-8EB2-D0121843474F}"/>
-              </a:ext>
-            </a:extLst>
-          </p:cNvPr>
-          <p:cNvPicPr>
-            <a:picLocks noChangeAspect="1"/>
-          </p:cNvPicPr>
-          <p:nvPr/>
-        </p:nvPicPr>
-        <p:blipFill>
-          <a:blip r:embed="rId6"/>
-          <a:stretch>
-            <a:fillRect/>
-          </a:stretch>
-        </p:blipFill>
-        <p:spPr>
-          <a:xfrm>
-            <a:off x="552863" y="3640717"/>
-            <a:ext cx="1743075" cy="1152525"/>
-          </a:xfrm>
-          <a:prstGeom prst="rect">
-            <a:avLst/>
-          </a:prstGeom>
-        </p:spPr>
-      </p:pic>
-      <p:sp>
-        <p:nvSpPr>
-          <p:cNvPr id="12" name="Oval 11">
-            <a:extLst>
-              <a:ext uri="{FF2B5EF4-FFF2-40B4-BE49-F238E27FC236}">
-                <a16:creationId xmlns:a16="http://schemas.microsoft.com/office/drawing/2014/main" id="{F75929AA-F280-4039-A380-C25934960838}"/>
-              </a:ext>
-            </a:extLst>
-          </p:cNvPr>
-          <p:cNvSpPr/>
-          <p:nvPr/>
-        </p:nvSpPr>
-        <p:spPr>
-          <a:xfrm>
-            <a:off x="6212475" y="964215"/>
-            <a:ext cx="364435" cy="323851"/>
-          </a:xfrm>
-          <a:prstGeom prst="ellipse">
-            <a:avLst/>
-          </a:prstGeom>
-          <a:solidFill>
-            <a:schemeClr val="accent5">
-              <a:lumMod val="60000"/>
-              <a:lumOff val="40000"/>
-            </a:schemeClr>
-          </a:solidFill>
-          <a:ln>
-            <a:solidFill>
-              <a:schemeClr val="accent5">
-                <a:lumMod val="60000"/>
-                <a:lumOff val="40000"/>
-              </a:schemeClr>
-            </a:solidFill>
-          </a:ln>
-        </p:spPr>
-        <p:style>
-          <a:lnRef idx="2">
-            <a:schemeClr val="accent1">
-              <a:shade val="50000"/>
-            </a:schemeClr>
-          </a:lnRef>
-          <a:fillRef idx="1">
-            <a:schemeClr val="accent1"/>
-          </a:fillRef>
-          <a:effectRef idx="0">
-            <a:schemeClr val="accent1"/>
-          </a:effectRef>
-          <a:fontRef idx="minor">
-            <a:schemeClr val="lt1"/>
-          </a:fontRef>
-        </p:style>
-        <p:txBody>
-          <a:bodyPr rtlCol="0" anchor="ctr"/>
-          <a:lstStyle/>
-          <a:p>
-            <a:pPr algn="ctr"/>
-            <a:r>
-              <a:rPr lang="en-IN" b="1" dirty="0">
-                <a:solidFill>
-                  <a:srgbClr val="4C4C4C"/>
-                </a:solidFill>
-              </a:rPr>
-              <a:t>1</a:t>
-            </a:r>
-            <a:endParaRPr lang="en-IN" b="1" u="sng" dirty="0">
-              <a:solidFill>
-                <a:srgbClr val="4C4C4C"/>
-              </a:solidFill>
-            </a:endParaRPr>
-          </a:p>
-        </p:txBody>
-      </p:sp>
-      <p:sp>
-        <p:nvSpPr>
-          <p:cNvPr id="13" name="Oval 12">
-            <a:extLst>
-              <a:ext uri="{FF2B5EF4-FFF2-40B4-BE49-F238E27FC236}">
-                <a16:creationId xmlns:a16="http://schemas.microsoft.com/office/drawing/2014/main" id="{F90C427D-DC79-4C7D-89FF-54A052FEF9E4}"/>
-              </a:ext>
-            </a:extLst>
-          </p:cNvPr>
-          <p:cNvSpPr/>
-          <p:nvPr/>
-        </p:nvSpPr>
-        <p:spPr>
-          <a:xfrm>
-            <a:off x="606805" y="2372379"/>
-            <a:ext cx="364435" cy="323851"/>
-          </a:xfrm>
-          <a:prstGeom prst="ellipse">
-            <a:avLst/>
-          </a:prstGeom>
-          <a:solidFill>
-            <a:schemeClr val="accent5">
-              <a:lumMod val="60000"/>
-              <a:lumOff val="40000"/>
-            </a:schemeClr>
-          </a:solidFill>
-          <a:ln>
-            <a:solidFill>
-              <a:schemeClr val="accent5">
-                <a:lumMod val="60000"/>
-                <a:lumOff val="40000"/>
-              </a:schemeClr>
-            </a:solidFill>
-          </a:ln>
-        </p:spPr>
-        <p:style>
-          <a:lnRef idx="2">
-            <a:schemeClr val="accent1">
-              <a:shade val="50000"/>
-            </a:schemeClr>
-          </a:lnRef>
-          <a:fillRef idx="1">
-            <a:schemeClr val="accent1"/>
-          </a:fillRef>
-          <a:effectRef idx="0">
-            <a:schemeClr val="accent1"/>
-          </a:effectRef>
-          <a:fontRef idx="minor">
-            <a:schemeClr val="lt1"/>
-          </a:fontRef>
-        </p:style>
-        <p:txBody>
-          <a:bodyPr rtlCol="0" anchor="ctr"/>
-          <a:lstStyle/>
-          <a:p>
-            <a:pPr algn="ctr"/>
-            <a:r>
-              <a:rPr lang="en-IN" b="1" dirty="0">
-                <a:solidFill>
-                  <a:srgbClr val="4C4C4C"/>
-                </a:solidFill>
-              </a:rPr>
-              <a:t>2</a:t>
-            </a:r>
-            <a:endParaRPr lang="en-IN" b="1" u="sng" dirty="0">
-              <a:solidFill>
-                <a:srgbClr val="4C4C4C"/>
-              </a:solidFill>
-            </a:endParaRPr>
-          </a:p>
-        </p:txBody>
-      </p:sp>
-      <p:sp>
-        <p:nvSpPr>
-          <p:cNvPr id="14" name="Oval 13">
-            <a:extLst>
-              <a:ext uri="{FF2B5EF4-FFF2-40B4-BE49-F238E27FC236}">
-                <a16:creationId xmlns:a16="http://schemas.microsoft.com/office/drawing/2014/main" id="{4FB291B6-DE85-4EEE-9A9C-463F393BBA0E}"/>
-              </a:ext>
-            </a:extLst>
-          </p:cNvPr>
-          <p:cNvSpPr/>
-          <p:nvPr/>
-        </p:nvSpPr>
-        <p:spPr>
-          <a:xfrm>
-            <a:off x="3542162" y="2345784"/>
-            <a:ext cx="364435" cy="323851"/>
-          </a:xfrm>
-          <a:prstGeom prst="ellipse">
-            <a:avLst/>
-          </a:prstGeom>
-          <a:solidFill>
-            <a:schemeClr val="accent5">
-              <a:lumMod val="60000"/>
-              <a:lumOff val="40000"/>
-            </a:schemeClr>
-          </a:solidFill>
-          <a:ln>
-            <a:solidFill>
-              <a:schemeClr val="accent5">
-                <a:lumMod val="60000"/>
-                <a:lumOff val="40000"/>
-              </a:schemeClr>
-            </a:solidFill>
-          </a:ln>
-        </p:spPr>
-        <p:style>
-          <a:lnRef idx="2">
-            <a:schemeClr val="accent1">
-              <a:shade val="50000"/>
-            </a:schemeClr>
-          </a:lnRef>
-          <a:fillRef idx="1">
-            <a:schemeClr val="accent1"/>
-          </a:fillRef>
-          <a:effectRef idx="0">
-            <a:schemeClr val="accent1"/>
-          </a:effectRef>
-          <a:fontRef idx="minor">
-            <a:schemeClr val="lt1"/>
-          </a:fontRef>
-        </p:style>
-        <p:txBody>
-          <a:bodyPr rtlCol="0" anchor="ctr"/>
-          <a:lstStyle/>
-          <a:p>
-            <a:pPr algn="ctr"/>
-            <a:r>
-              <a:rPr lang="en-IN" b="1" dirty="0">
-                <a:solidFill>
-                  <a:srgbClr val="4C4C4C"/>
-                </a:solidFill>
-              </a:rPr>
-              <a:t>3</a:t>
-            </a:r>
-          </a:p>
-        </p:txBody>
-      </p:sp>
-      <p:sp>
-        <p:nvSpPr>
-          <p:cNvPr id="15" name="Oval 14">
-            <a:extLst>
-              <a:ext uri="{FF2B5EF4-FFF2-40B4-BE49-F238E27FC236}">
-                <a16:creationId xmlns:a16="http://schemas.microsoft.com/office/drawing/2014/main" id="{A2019BD5-9CB6-46D6-A6B6-DEBA0E3BA3DF}"/>
-              </a:ext>
-            </a:extLst>
-          </p:cNvPr>
-          <p:cNvSpPr/>
-          <p:nvPr/>
-        </p:nvSpPr>
-        <p:spPr>
-          <a:xfrm>
-            <a:off x="606805" y="3353788"/>
-            <a:ext cx="364435" cy="323851"/>
-          </a:xfrm>
-          <a:prstGeom prst="ellipse">
-            <a:avLst/>
-          </a:prstGeom>
-          <a:solidFill>
-            <a:schemeClr val="accent5">
-              <a:lumMod val="60000"/>
-              <a:lumOff val="40000"/>
-            </a:schemeClr>
-          </a:solidFill>
-          <a:ln>
-            <a:solidFill>
-              <a:schemeClr val="accent5">
-                <a:lumMod val="60000"/>
-                <a:lumOff val="40000"/>
-              </a:schemeClr>
-            </a:solidFill>
-          </a:ln>
-        </p:spPr>
-        <p:style>
-          <a:lnRef idx="2">
-            <a:schemeClr val="accent1">
-              <a:shade val="50000"/>
-            </a:schemeClr>
-          </a:lnRef>
-          <a:fillRef idx="1">
-            <a:schemeClr val="accent1"/>
-          </a:fillRef>
-          <a:effectRef idx="0">
-            <a:schemeClr val="accent1"/>
-          </a:effectRef>
-          <a:fontRef idx="minor">
-            <a:schemeClr val="lt1"/>
-          </a:fontRef>
-        </p:style>
-        <p:txBody>
-          <a:bodyPr rtlCol="0" anchor="ctr"/>
-          <a:lstStyle/>
-          <a:p>
-            <a:pPr algn="ctr"/>
-            <a:r>
-              <a:rPr lang="en-IN" b="1" dirty="0">
-                <a:solidFill>
-                  <a:srgbClr val="4C4C4C"/>
-                </a:solidFill>
-              </a:rPr>
-              <a:t>4</a:t>
-            </a:r>
-          </a:p>
-        </p:txBody>
-      </p:sp>
-      <p:sp>
-        <p:nvSpPr>
-          <p:cNvPr id="16" name="Oval 15">
-            <a:extLst>
-              <a:ext uri="{FF2B5EF4-FFF2-40B4-BE49-F238E27FC236}">
-                <a16:creationId xmlns:a16="http://schemas.microsoft.com/office/drawing/2014/main" id="{0C72BE74-07BF-42ED-A689-B670EC391969}"/>
-              </a:ext>
-            </a:extLst>
-          </p:cNvPr>
-          <p:cNvSpPr/>
-          <p:nvPr/>
-        </p:nvSpPr>
-        <p:spPr>
-          <a:xfrm>
-            <a:off x="2848506" y="3583722"/>
-            <a:ext cx="364435" cy="323851"/>
-          </a:xfrm>
-          <a:prstGeom prst="ellipse">
-            <a:avLst/>
-          </a:prstGeom>
-          <a:solidFill>
-            <a:schemeClr val="accent5">
-              <a:lumMod val="60000"/>
-              <a:lumOff val="40000"/>
-            </a:schemeClr>
-          </a:solidFill>
-          <a:ln>
-            <a:solidFill>
-              <a:schemeClr val="accent5">
-                <a:lumMod val="60000"/>
-                <a:lumOff val="40000"/>
-              </a:schemeClr>
-            </a:solidFill>
-          </a:ln>
-        </p:spPr>
-        <p:style>
-          <a:lnRef idx="2">
-            <a:schemeClr val="accent1">
-              <a:shade val="50000"/>
-            </a:schemeClr>
-          </a:lnRef>
-          <a:fillRef idx="1">
-            <a:schemeClr val="accent1"/>
-          </a:fillRef>
-          <a:effectRef idx="0">
-            <a:schemeClr val="accent1"/>
-          </a:effectRef>
-          <a:fontRef idx="minor">
-            <a:schemeClr val="lt1"/>
-          </a:fontRef>
-        </p:style>
-        <p:txBody>
-          <a:bodyPr rtlCol="0" anchor="ctr"/>
-          <a:lstStyle/>
-          <a:p>
-            <a:pPr algn="ctr"/>
-            <a:r>
-              <a:rPr lang="en-IN" b="1" dirty="0">
-                <a:solidFill>
-                  <a:srgbClr val="4C4C4C"/>
-                </a:solidFill>
-              </a:rPr>
-              <a:t>5</a:t>
-            </a:r>
-          </a:p>
-        </p:txBody>
-      </p:sp>
     </p:spTree>
     <p:extLst>
       <p:ext uri="{BB962C8B-B14F-4D97-AF65-F5344CB8AC3E}">
-        <p14:creationId xmlns:p14="http://schemas.microsoft.com/office/powerpoint/2010/main" val="1004328066"/>
-      </p:ext>
-    </p:extLst>
-  </p:cSld>
-  <p:clrMapOvr>
-    <a:masterClrMapping/>
-  </p:clrMapOvr>
-</p:sld>
-</file>
-
-<file path=ppt/slides/slide13.xml><?xml version="1.0" encoding="utf-8"?>
-<p:sld xmlns:a="http://schemas.openxmlformats.org/drawingml/2006/main" xmlns:r="http://schemas.openxmlformats.org/officeDocument/2006/relationships" xmlns:p="http://schemas.openxmlformats.org/presentationml/2006/main">
-  <p:cSld>
-    <p:spTree>
-      <p:nvGrpSpPr>
-        <p:cNvPr id="1" name=""/>
-        <p:cNvGrpSpPr/>
-        <p:nvPr/>
-      </p:nvGrpSpPr>
-      <p:grpSpPr>
-        <a:xfrm>
-          <a:off x="0" y="0"/>
-          <a:ext cx="0" cy="0"/>
-          <a:chOff x="0" y="0"/>
-          <a:chExt cx="0" cy="0"/>
-        </a:xfrm>
-      </p:grpSpPr>
-      <p:sp>
-        <p:nvSpPr>
-          <p:cNvPr id="2" name="Title 1">
-            <a:extLst>
-              <a:ext uri="{FF2B5EF4-FFF2-40B4-BE49-F238E27FC236}">
-                <a16:creationId xmlns:a16="http://schemas.microsoft.com/office/drawing/2014/main" id="{25DA22B9-0533-49CB-9A88-80323F85F2E8}"/>
-              </a:ext>
-            </a:extLst>
-          </p:cNvPr>
-          <p:cNvSpPr>
-            <a:spLocks noGrp="1"/>
-          </p:cNvSpPr>
-          <p:nvPr>
-            <p:ph type="title"/>
-          </p:nvPr>
-        </p:nvSpPr>
-        <p:spPr/>
-        <p:txBody>
-          <a:bodyPr/>
-          <a:lstStyle/>
-          <a:p>
-            <a:r>
-              <a:rPr lang="en-IN" dirty="0"/>
-              <a:t>Basics of Python</a:t>
-            </a:r>
-          </a:p>
-        </p:txBody>
-      </p:sp>
-      <p:sp>
-        <p:nvSpPr>
-          <p:cNvPr id="3" name="Content Placeholder 2">
-            <a:extLst>
-              <a:ext uri="{FF2B5EF4-FFF2-40B4-BE49-F238E27FC236}">
-                <a16:creationId xmlns:a16="http://schemas.microsoft.com/office/drawing/2014/main" id="{623D4476-CBF1-46EA-925A-93CEEB95981F}"/>
-              </a:ext>
-            </a:extLst>
-          </p:cNvPr>
-          <p:cNvSpPr>
-            <a:spLocks noGrp="1"/>
-          </p:cNvSpPr>
-          <p:nvPr>
-            <p:ph idx="1"/>
-          </p:nvPr>
-        </p:nvSpPr>
-        <p:spPr/>
-        <p:txBody>
-          <a:bodyPr/>
-          <a:lstStyle/>
-          <a:p>
-            <a:r>
-              <a:rPr lang="en-IN" dirty="0"/>
-              <a:t>Type casting</a:t>
-            </a:r>
-          </a:p>
-          <a:p>
-            <a:r>
-              <a:rPr lang="en-IN" dirty="0"/>
-              <a:t>Usage of Conditional and Looping blocks</a:t>
-            </a:r>
-          </a:p>
-          <a:p>
-            <a:r>
-              <a:rPr lang="en-IN" dirty="0"/>
-              <a:t>Iteration and accessing </a:t>
-            </a:r>
-          </a:p>
-          <a:p>
-            <a:pPr lvl="1"/>
-            <a:r>
-              <a:rPr lang="en-IN" dirty="0"/>
-              <a:t>List (Iterate and access the elements)</a:t>
-            </a:r>
-          </a:p>
-          <a:p>
-            <a:pPr lvl="1"/>
-            <a:r>
-              <a:rPr lang="en-IN" dirty="0"/>
-              <a:t>Tuple</a:t>
-            </a:r>
-          </a:p>
-          <a:p>
-            <a:pPr lvl="1"/>
-            <a:r>
-              <a:rPr lang="en-IN" dirty="0"/>
-              <a:t>Range</a:t>
-            </a:r>
-          </a:p>
-          <a:p>
-            <a:pPr lvl="1"/>
-            <a:r>
-              <a:rPr lang="en-IN" dirty="0" err="1"/>
-              <a:t>Dict</a:t>
-            </a:r>
-            <a:r>
-              <a:rPr lang="en-IN" dirty="0"/>
-              <a:t> (Access elements by key as well as index)</a:t>
-            </a:r>
-          </a:p>
-          <a:p>
-            <a:pPr lvl="1"/>
-            <a:r>
-              <a:rPr lang="en-IN" dirty="0"/>
-              <a:t>Sets</a:t>
-            </a:r>
-          </a:p>
-          <a:p>
-            <a:endParaRPr lang="en-IN" dirty="0"/>
-          </a:p>
-          <a:p>
-            <a:pPr marL="0" indent="0">
-              <a:buNone/>
-            </a:pPr>
-            <a:endParaRPr lang="en-IN" dirty="0"/>
-          </a:p>
-          <a:p>
-            <a:endParaRPr lang="en-IN" dirty="0"/>
-          </a:p>
-        </p:txBody>
-      </p:sp>
-      <p:sp>
-        <p:nvSpPr>
-          <p:cNvPr id="4" name="Text Placeholder 3">
-            <a:extLst>
-              <a:ext uri="{FF2B5EF4-FFF2-40B4-BE49-F238E27FC236}">
-                <a16:creationId xmlns:a16="http://schemas.microsoft.com/office/drawing/2014/main" id="{A305CA6C-C0E9-4477-8DB9-F1FCD73E0849}"/>
-              </a:ext>
-            </a:extLst>
-          </p:cNvPr>
-          <p:cNvSpPr>
-            <a:spLocks noGrp="1"/>
-          </p:cNvSpPr>
-          <p:nvPr>
-            <p:ph type="body" sz="quarter" idx="13"/>
-          </p:nvPr>
-        </p:nvSpPr>
-        <p:spPr/>
-        <p:txBody>
-          <a:bodyPr/>
-          <a:lstStyle/>
-          <a:p>
-            <a:r>
-              <a:rPr lang="en-IN" dirty="0"/>
-              <a:t>Topics to learn</a:t>
-            </a:r>
-          </a:p>
-        </p:txBody>
-      </p:sp>
-      <p:sp>
-        <p:nvSpPr>
-          <p:cNvPr id="5" name="Slide Number Placeholder 4">
-            <a:extLst>
-              <a:ext uri="{FF2B5EF4-FFF2-40B4-BE49-F238E27FC236}">
-                <a16:creationId xmlns:a16="http://schemas.microsoft.com/office/drawing/2014/main" id="{2D13DBC3-94A6-4A48-A29B-243CEA70C08F}"/>
-              </a:ext>
-            </a:extLst>
-          </p:cNvPr>
-          <p:cNvSpPr>
-            <a:spLocks noGrp="1"/>
-          </p:cNvSpPr>
-          <p:nvPr>
-            <p:ph type="sldNum" sz="quarter" idx="14"/>
-          </p:nvPr>
-        </p:nvSpPr>
-        <p:spPr/>
-        <p:txBody>
-          <a:bodyPr/>
-          <a:lstStyle/>
-          <a:p>
-            <a:fld id="{E33D0D4A-F9CC-8542-A7C1-048739268B18}" type="slidenum">
-              <a:rPr lang="en-US" smtClean="0"/>
-              <a:pPr/>
-              <a:t>13</a:t>
-            </a:fld>
-            <a:endParaRPr lang="en-US"/>
-          </a:p>
-        </p:txBody>
-      </p:sp>
-    </p:spTree>
-    <p:extLst>
-      <p:ext uri="{BB962C8B-B14F-4D97-AF65-F5344CB8AC3E}">
-        <p14:creationId xmlns:p14="http://schemas.microsoft.com/office/powerpoint/2010/main" val="3119149307"/>
+        <p14:creationId xmlns:p14="http://schemas.microsoft.com/office/powerpoint/2010/main" val="3931635324"/>
       </p:ext>
     </p:extLst>
   </p:cSld>

</xml_diff>